<commit_message>
New code Frequency Correl Only Simu + MT180s
</commit_message>
<xml_diff>
--- a/MT180_2021/Finale régionale/ppt/MT180s.pptx
+++ b/MT180_2021/Finale régionale/ppt/MT180s.pptx
@@ -5,7 +5,7 @@
     <p:sldMasterId id="2147483648" r:id="rId1"/>
   </p:sldMasterIdLst>
   <p:notesMasterIdLst>
-    <p:notesMasterId r:id="rId13"/>
+    <p:notesMasterId r:id="rId16"/>
   </p:notesMasterIdLst>
   <p:sldIdLst>
     <p:sldId id="264" r:id="rId2"/>
@@ -19,6 +19,9 @@
     <p:sldId id="265" r:id="rId10"/>
     <p:sldId id="266" r:id="rId11"/>
     <p:sldId id="267" r:id="rId12"/>
+    <p:sldId id="271" r:id="rId13"/>
+    <p:sldId id="272" r:id="rId14"/>
+    <p:sldId id="273" r:id="rId15"/>
   </p:sldIdLst>
   <p:sldSz cx="12192000" cy="6858000"/>
   <p:notesSz cx="6858000" cy="9144000"/>
@@ -207,7 +210,7 @@
           <a:p>
             <a:fld id="{C847752D-401C-0346-A080-42C028000F44}" type="datetimeFigureOut">
               <a:rPr lang="fr-FR" smtClean="0"/>
-              <a:t>08/03/2021</a:t>
+              <a:t>10/03/2021</a:t>
             </a:fld>
             <a:endParaRPr lang="fr-FR"/>
           </a:p>
@@ -705,7 +708,7 @@
           <a:p>
             <a:fld id="{E55DF3B5-8CA8-224C-8E58-7FCF00493A41}" type="datetimeFigureOut">
               <a:rPr lang="fr-FR" smtClean="0"/>
-              <a:t>08/03/2021</a:t>
+              <a:t>10/03/2021</a:t>
             </a:fld>
             <a:endParaRPr lang="fr-FR"/>
           </a:p>
@@ -903,7 +906,7 @@
           <a:p>
             <a:fld id="{E55DF3B5-8CA8-224C-8E58-7FCF00493A41}" type="datetimeFigureOut">
               <a:rPr lang="fr-FR" smtClean="0"/>
-              <a:t>08/03/2021</a:t>
+              <a:t>10/03/2021</a:t>
             </a:fld>
             <a:endParaRPr lang="fr-FR"/>
           </a:p>
@@ -1111,7 +1114,7 @@
           <a:p>
             <a:fld id="{E55DF3B5-8CA8-224C-8E58-7FCF00493A41}" type="datetimeFigureOut">
               <a:rPr lang="fr-FR" smtClean="0"/>
-              <a:t>08/03/2021</a:t>
+              <a:t>10/03/2021</a:t>
             </a:fld>
             <a:endParaRPr lang="fr-FR"/>
           </a:p>
@@ -1309,7 +1312,7 @@
           <a:p>
             <a:fld id="{E55DF3B5-8CA8-224C-8E58-7FCF00493A41}" type="datetimeFigureOut">
               <a:rPr lang="fr-FR" smtClean="0"/>
-              <a:t>08/03/2021</a:t>
+              <a:t>10/03/2021</a:t>
             </a:fld>
             <a:endParaRPr lang="fr-FR"/>
           </a:p>
@@ -1584,7 +1587,7 @@
           <a:p>
             <a:fld id="{E55DF3B5-8CA8-224C-8E58-7FCF00493A41}" type="datetimeFigureOut">
               <a:rPr lang="fr-FR" smtClean="0"/>
-              <a:t>08/03/2021</a:t>
+              <a:t>10/03/2021</a:t>
             </a:fld>
             <a:endParaRPr lang="fr-FR"/>
           </a:p>
@@ -1849,7 +1852,7 @@
           <a:p>
             <a:fld id="{E55DF3B5-8CA8-224C-8E58-7FCF00493A41}" type="datetimeFigureOut">
               <a:rPr lang="fr-FR" smtClean="0"/>
-              <a:t>08/03/2021</a:t>
+              <a:t>10/03/2021</a:t>
             </a:fld>
             <a:endParaRPr lang="fr-FR"/>
           </a:p>
@@ -2261,7 +2264,7 @@
           <a:p>
             <a:fld id="{E55DF3B5-8CA8-224C-8E58-7FCF00493A41}" type="datetimeFigureOut">
               <a:rPr lang="fr-FR" smtClean="0"/>
-              <a:t>08/03/2021</a:t>
+              <a:t>10/03/2021</a:t>
             </a:fld>
             <a:endParaRPr lang="fr-FR"/>
           </a:p>
@@ -2402,7 +2405,7 @@
           <a:p>
             <a:fld id="{E55DF3B5-8CA8-224C-8E58-7FCF00493A41}" type="datetimeFigureOut">
               <a:rPr lang="fr-FR" smtClean="0"/>
-              <a:t>08/03/2021</a:t>
+              <a:t>10/03/2021</a:t>
             </a:fld>
             <a:endParaRPr lang="fr-FR"/>
           </a:p>
@@ -2515,7 +2518,7 @@
           <a:p>
             <a:fld id="{E55DF3B5-8CA8-224C-8E58-7FCF00493A41}" type="datetimeFigureOut">
               <a:rPr lang="fr-FR" smtClean="0"/>
-              <a:t>08/03/2021</a:t>
+              <a:t>10/03/2021</a:t>
             </a:fld>
             <a:endParaRPr lang="fr-FR"/>
           </a:p>
@@ -2826,7 +2829,7 @@
           <a:p>
             <a:fld id="{E55DF3B5-8CA8-224C-8E58-7FCF00493A41}" type="datetimeFigureOut">
               <a:rPr lang="fr-FR" smtClean="0"/>
-              <a:t>08/03/2021</a:t>
+              <a:t>10/03/2021</a:t>
             </a:fld>
             <a:endParaRPr lang="fr-FR"/>
           </a:p>
@@ -3114,7 +3117,7 @@
           <a:p>
             <a:fld id="{E55DF3B5-8CA8-224C-8E58-7FCF00493A41}" type="datetimeFigureOut">
               <a:rPr lang="fr-FR" smtClean="0"/>
-              <a:t>08/03/2021</a:t>
+              <a:t>10/03/2021</a:t>
             </a:fld>
             <a:endParaRPr lang="fr-FR"/>
           </a:p>
@@ -3355,7 +3358,7 @@
           <a:p>
             <a:fld id="{E55DF3B5-8CA8-224C-8E58-7FCF00493A41}" type="datetimeFigureOut">
               <a:rPr lang="fr-FR" smtClean="0"/>
-              <a:t>08/03/2021</a:t>
+              <a:t>10/03/2021</a:t>
             </a:fld>
             <a:endParaRPr lang="fr-FR"/>
           </a:p>
@@ -5610,6 +5613,976 @@
     <p:extLst>
       <p:ext uri="{BB962C8B-B14F-4D97-AF65-F5344CB8AC3E}">
         <p14:creationId xmlns:p14="http://schemas.microsoft.com/office/powerpoint/2010/main" val="3574075271"/>
+      </p:ext>
+    </p:extLst>
+  </p:cSld>
+  <p:clrMapOvr>
+    <a:masterClrMapping/>
+  </p:clrMapOvr>
+</p:sld>
+</file>
+
+<file path=ppt/slides/slide12.xml><?xml version="1.0" encoding="utf-8"?>
+<p:sld xmlns:a="http://schemas.openxmlformats.org/drawingml/2006/main" xmlns:r="http://schemas.openxmlformats.org/officeDocument/2006/relationships" xmlns:p="http://schemas.openxmlformats.org/presentationml/2006/main">
+  <p:cSld>
+    <p:bg>
+      <p:bgPr>
+        <a:solidFill>
+          <a:schemeClr val="bg1"/>
+        </a:solidFill>
+        <a:effectLst/>
+      </p:bgPr>
+    </p:bg>
+    <p:spTree>
+      <p:nvGrpSpPr>
+        <p:cNvPr id="1" name=""/>
+        <p:cNvGrpSpPr/>
+        <p:nvPr/>
+      </p:nvGrpSpPr>
+      <p:grpSpPr>
+        <a:xfrm>
+          <a:off x="0" y="0"/>
+          <a:ext cx="0" cy="0"/>
+          <a:chOff x="0" y="0"/>
+          <a:chExt cx="0" cy="0"/>
+        </a:xfrm>
+      </p:grpSpPr>
+      <p:sp useBgFill="1">
+        <p:nvSpPr>
+          <p:cNvPr id="35" name="Rectangle 31">
+            <a:extLst>
+              <a:ext uri="{FF2B5EF4-FFF2-40B4-BE49-F238E27FC236}">
+                <a16:creationId xmlns:a16="http://schemas.microsoft.com/office/drawing/2014/main" id="{C83A5C14-ED91-4CD1-809E-D29FF97C9AF5}"/>
+              </a:ext>
+              <a:ext uri="{C183D7F6-B498-43B3-948B-1728B52AA6E4}">
+                <adec:decorative xmlns:adec="http://schemas.microsoft.com/office/drawing/2017/decorative" val="1"/>
+              </a:ext>
+            </a:extLst>
+          </p:cNvPr>
+          <p:cNvSpPr>
+            <a:spLocks noGrp="1" noRot="1" noChangeAspect="1" noMove="1" noResize="1" noEditPoints="1" noAdjustHandles="1" noChangeArrowheads="1" noChangeShapeType="1" noTextEdit="1"/>
+          </p:cNvSpPr>
+          <p:nvPr>
+            <p:extLst>
+              <p:ext uri="{386F3935-93C4-4BCD-93E2-E3B085C9AB24}">
+                <p16:designElem xmlns:p16="http://schemas.microsoft.com/office/powerpoint/2015/main" val="1"/>
+              </p:ext>
+            </p:extLst>
+          </p:nvPr>
+        </p:nvSpPr>
+        <p:spPr>
+          <a:xfrm>
+            <a:off x="0" y="0"/>
+            <a:ext cx="12192000" cy="6858000"/>
+          </a:xfrm>
+          <a:prstGeom prst="rect">
+            <a:avLst/>
+          </a:prstGeom>
+          <a:ln>
+            <a:noFill/>
+          </a:ln>
+        </p:spPr>
+        <p:style>
+          <a:lnRef idx="2">
+            <a:schemeClr val="accent1">
+              <a:shade val="50000"/>
+            </a:schemeClr>
+          </a:lnRef>
+          <a:fillRef idx="1">
+            <a:schemeClr val="accent1"/>
+          </a:fillRef>
+          <a:effectRef idx="0">
+            <a:schemeClr val="accent1"/>
+          </a:effectRef>
+          <a:fontRef idx="minor">
+            <a:schemeClr val="lt1"/>
+          </a:fontRef>
+        </p:style>
+        <p:txBody>
+          <a:bodyPr rtlCol="0" anchor="ctr"/>
+          <a:lstStyle/>
+          <a:p>
+            <a:pPr algn="ctr"/>
+            <a:endParaRPr lang="en-US"/>
+          </a:p>
+        </p:txBody>
+      </p:sp>
+      <p:sp useBgFill="1">
+        <p:nvSpPr>
+          <p:cNvPr id="34" name="Freeform: Shape 33">
+            <a:extLst>
+              <a:ext uri="{FF2B5EF4-FFF2-40B4-BE49-F238E27FC236}">
+                <a16:creationId xmlns:a16="http://schemas.microsoft.com/office/drawing/2014/main" id="{56065185-5C34-4F86-AA96-AA4D065B0EF4}"/>
+              </a:ext>
+              <a:ext uri="{C183D7F6-B498-43B3-948B-1728B52AA6E4}">
+                <adec:decorative xmlns:adec="http://schemas.microsoft.com/office/drawing/2017/decorative" val="1"/>
+              </a:ext>
+            </a:extLst>
+          </p:cNvPr>
+          <p:cNvSpPr>
+            <a:spLocks noGrp="1" noRot="1" noChangeAspect="1" noMove="1" noResize="1" noEditPoints="1" noAdjustHandles="1" noChangeArrowheads="1" noChangeShapeType="1" noTextEdit="1"/>
+          </p:cNvSpPr>
+          <p:nvPr>
+            <p:extLst>
+              <p:ext uri="{386F3935-93C4-4BCD-93E2-E3B085C9AB24}">
+                <p16:designElem xmlns:p16="http://schemas.microsoft.com/office/powerpoint/2015/main" val="1"/>
+              </p:ext>
+            </p:extLst>
+          </p:nvPr>
+        </p:nvSpPr>
+        <p:spPr>
+          <a:xfrm>
+            <a:off x="1114425" y="0"/>
+            <a:ext cx="9963150" cy="6858000"/>
+          </a:xfrm>
+          <a:custGeom>
+            <a:avLst/>
+            <a:gdLst>
+              <a:gd name="connsiteX0" fmla="*/ 1595771 w 9963150"/>
+              <a:gd name="connsiteY0" fmla="*/ 0 h 6858000"/>
+              <a:gd name="connsiteX1" fmla="*/ 8367379 w 9963150"/>
+              <a:gd name="connsiteY1" fmla="*/ 0 h 6858000"/>
+              <a:gd name="connsiteX2" fmla="*/ 8504080 w 9963150"/>
+              <a:gd name="connsiteY2" fmla="*/ 130333 h 6858000"/>
+              <a:gd name="connsiteX3" fmla="*/ 9963150 w 9963150"/>
+              <a:gd name="connsiteY3" fmla="*/ 3652838 h 6858000"/>
+              <a:gd name="connsiteX4" fmla="*/ 8825600 w 9963150"/>
+              <a:gd name="connsiteY4" fmla="*/ 6821583 h 6858000"/>
+              <a:gd name="connsiteX5" fmla="*/ 8794055 w 9963150"/>
+              <a:gd name="connsiteY5" fmla="*/ 6858000 h 6858000"/>
+              <a:gd name="connsiteX6" fmla="*/ 1169096 w 9963150"/>
+              <a:gd name="connsiteY6" fmla="*/ 6858000 h 6858000"/>
+              <a:gd name="connsiteX7" fmla="*/ 1137550 w 9963150"/>
+              <a:gd name="connsiteY7" fmla="*/ 6821583 h 6858000"/>
+              <a:gd name="connsiteX8" fmla="*/ 0 w 9963150"/>
+              <a:gd name="connsiteY8" fmla="*/ 3652838 h 6858000"/>
+              <a:gd name="connsiteX9" fmla="*/ 1459070 w 9963150"/>
+              <a:gd name="connsiteY9" fmla="*/ 130333 h 6858000"/>
+            </a:gdLst>
+            <a:ahLst/>
+            <a:cxnLst>
+              <a:cxn ang="0">
+                <a:pos x="connsiteX0" y="connsiteY0"/>
+              </a:cxn>
+              <a:cxn ang="0">
+                <a:pos x="connsiteX1" y="connsiteY1"/>
+              </a:cxn>
+              <a:cxn ang="0">
+                <a:pos x="connsiteX2" y="connsiteY2"/>
+              </a:cxn>
+              <a:cxn ang="0">
+                <a:pos x="connsiteX3" y="connsiteY3"/>
+              </a:cxn>
+              <a:cxn ang="0">
+                <a:pos x="connsiteX4" y="connsiteY4"/>
+              </a:cxn>
+              <a:cxn ang="0">
+                <a:pos x="connsiteX5" y="connsiteY5"/>
+              </a:cxn>
+              <a:cxn ang="0">
+                <a:pos x="connsiteX6" y="connsiteY6"/>
+              </a:cxn>
+              <a:cxn ang="0">
+                <a:pos x="connsiteX7" y="connsiteY7"/>
+              </a:cxn>
+              <a:cxn ang="0">
+                <a:pos x="connsiteX8" y="connsiteY8"/>
+              </a:cxn>
+              <a:cxn ang="0">
+                <a:pos x="connsiteX9" y="connsiteY9"/>
+              </a:cxn>
+            </a:cxnLst>
+            <a:rect l="l" t="t" r="r" b="b"/>
+            <a:pathLst>
+              <a:path w="9963150" h="6858000">
+                <a:moveTo>
+                  <a:pt x="1595771" y="0"/>
+                </a:moveTo>
+                <a:lnTo>
+                  <a:pt x="8367379" y="0"/>
+                </a:lnTo>
+                <a:lnTo>
+                  <a:pt x="8504080" y="130333"/>
+                </a:lnTo>
+                <a:cubicBezTo>
+                  <a:pt x="9405568" y="1031820"/>
+                  <a:pt x="9963150" y="2277214"/>
+                  <a:pt x="9963150" y="3652838"/>
+                </a:cubicBezTo>
+                <a:cubicBezTo>
+                  <a:pt x="9963150" y="4856509"/>
+                  <a:pt x="9536251" y="5960473"/>
+                  <a:pt x="8825600" y="6821583"/>
+                </a:cubicBezTo>
+                <a:lnTo>
+                  <a:pt x="8794055" y="6858000"/>
+                </a:lnTo>
+                <a:lnTo>
+                  <a:pt x="1169096" y="6858000"/>
+                </a:lnTo>
+                <a:lnTo>
+                  <a:pt x="1137550" y="6821583"/>
+                </a:lnTo>
+                <a:cubicBezTo>
+                  <a:pt x="426899" y="5960473"/>
+                  <a:pt x="0" y="4856509"/>
+                  <a:pt x="0" y="3652838"/>
+                </a:cubicBezTo>
+                <a:cubicBezTo>
+                  <a:pt x="0" y="2277214"/>
+                  <a:pt x="557582" y="1031820"/>
+                  <a:pt x="1459070" y="130333"/>
+                </a:cubicBezTo>
+                <a:close/>
+              </a:path>
+            </a:pathLst>
+          </a:custGeom>
+          <a:ln w="9525">
+            <a:solidFill>
+              <a:srgbClr val="EFEFEF"/>
+            </a:solidFill>
+          </a:ln>
+          <a:effectLst>
+            <a:outerShdw blurRad="101600" sx="102000" sy="102000" algn="ctr" rotWithShape="0">
+              <a:schemeClr val="bg1">
+                <a:lumMod val="85000"/>
+                <a:alpha val="50000"/>
+              </a:schemeClr>
+            </a:outerShdw>
+          </a:effectLst>
+        </p:spPr>
+        <p:style>
+          <a:lnRef idx="2">
+            <a:schemeClr val="accent1">
+              <a:shade val="50000"/>
+            </a:schemeClr>
+          </a:lnRef>
+          <a:fillRef idx="1">
+            <a:schemeClr val="accent1"/>
+          </a:fillRef>
+          <a:effectRef idx="0">
+            <a:schemeClr val="accent1"/>
+          </a:effectRef>
+          <a:fontRef idx="minor">
+            <a:schemeClr val="lt1"/>
+          </a:fontRef>
+        </p:style>
+        <p:txBody>
+          <a:bodyPr wrap="square" rtlCol="0" anchor="ctr">
+            <a:noAutofit/>
+          </a:bodyPr>
+          <a:lstStyle/>
+          <a:p>
+            <a:pPr marL="0" marR="0" lvl="0" indent="0" algn="ctr" defTabSz="914400" rtl="0" eaLnBrk="1" fontAlgn="auto" latinLnBrk="0" hangingPunct="1">
+              <a:lnSpc>
+                <a:spcPct val="100000"/>
+              </a:lnSpc>
+              <a:spcBef>
+                <a:spcPts val="0"/>
+              </a:spcBef>
+              <a:spcAft>
+                <a:spcPts val="0"/>
+              </a:spcAft>
+              <a:buClrTx/>
+              <a:buSzTx/>
+              <a:buFontTx/>
+              <a:buNone/>
+              <a:tabLst/>
+              <a:defRPr/>
+            </a:pPr>
+            <a:endParaRPr kumimoji="0" lang="en-US" sz="1800" b="0" i="0" u="none" strike="noStrike" kern="1200" cap="none" spc="0" normalizeH="0" baseline="0" noProof="0">
+              <a:ln>
+                <a:noFill/>
+              </a:ln>
+              <a:solidFill>
+                <a:prstClr val="white"/>
+              </a:solidFill>
+              <a:effectLst/>
+              <a:uLnTx/>
+              <a:uFillTx/>
+              <a:latin typeface="Calibri" panose="020F0502020204030204"/>
+              <a:ea typeface="+mn-ea"/>
+              <a:cs typeface="+mn-cs"/>
+            </a:endParaRPr>
+          </a:p>
+        </p:txBody>
+      </p:sp>
+      <p:pic>
+        <p:nvPicPr>
+          <p:cNvPr id="13" name="Espace réservé du contenu 8" descr="Une image contenant personne, homme, intérieur&#10;&#10;Description générée automatiquement">
+            <a:extLst>
+              <a:ext uri="{FF2B5EF4-FFF2-40B4-BE49-F238E27FC236}">
+                <a16:creationId xmlns:a16="http://schemas.microsoft.com/office/drawing/2014/main" id="{FF3CE1CD-27A6-9B47-8EF0-E128EC7E2053}"/>
+              </a:ext>
+            </a:extLst>
+          </p:cNvPr>
+          <p:cNvPicPr>
+            <a:picLocks noChangeAspect="1"/>
+          </p:cNvPicPr>
+          <p:nvPr/>
+        </p:nvPicPr>
+        <p:blipFill rotWithShape="1">
+          <a:blip r:embed="rId2"/>
+          <a:srcRect l="19227" r="8134"/>
+          <a:stretch/>
+        </p:blipFill>
+        <p:spPr>
+          <a:xfrm>
+            <a:off x="1114426" y="10"/>
+            <a:ext cx="9963149" cy="6857990"/>
+          </a:xfrm>
+          <a:custGeom>
+            <a:avLst/>
+            <a:gdLst/>
+            <a:ahLst/>
+            <a:cxnLst/>
+            <a:rect l="l" t="t" r="r" b="b"/>
+            <a:pathLst>
+              <a:path w="9948672" h="6858000">
+                <a:moveTo>
+                  <a:pt x="1593452" y="0"/>
+                </a:moveTo>
+                <a:lnTo>
+                  <a:pt x="8355220" y="0"/>
+                </a:lnTo>
+                <a:lnTo>
+                  <a:pt x="8491722" y="130333"/>
+                </a:lnTo>
+                <a:cubicBezTo>
+                  <a:pt x="9391900" y="1031820"/>
+                  <a:pt x="9948672" y="2277214"/>
+                  <a:pt x="9948672" y="3652838"/>
+                </a:cubicBezTo>
+                <a:cubicBezTo>
+                  <a:pt x="9948672" y="4856509"/>
+                  <a:pt x="9522393" y="5960473"/>
+                  <a:pt x="8812775" y="6821583"/>
+                </a:cubicBezTo>
+                <a:lnTo>
+                  <a:pt x="8781276" y="6858000"/>
+                </a:lnTo>
+                <a:lnTo>
+                  <a:pt x="1167397" y="6858000"/>
+                </a:lnTo>
+                <a:lnTo>
+                  <a:pt x="1135897" y="6821583"/>
+                </a:lnTo>
+                <a:cubicBezTo>
+                  <a:pt x="426279" y="5960473"/>
+                  <a:pt x="0" y="4856509"/>
+                  <a:pt x="0" y="3652838"/>
+                </a:cubicBezTo>
+                <a:cubicBezTo>
+                  <a:pt x="0" y="2277214"/>
+                  <a:pt x="556772" y="1031820"/>
+                  <a:pt x="1456950" y="130333"/>
+                </a:cubicBezTo>
+                <a:close/>
+              </a:path>
+            </a:pathLst>
+          </a:custGeom>
+        </p:spPr>
+      </p:pic>
+    </p:spTree>
+    <p:extLst>
+      <p:ext uri="{BB962C8B-B14F-4D97-AF65-F5344CB8AC3E}">
+        <p14:creationId xmlns:p14="http://schemas.microsoft.com/office/powerpoint/2010/main" val="4153751349"/>
+      </p:ext>
+    </p:extLst>
+  </p:cSld>
+  <p:clrMapOvr>
+    <a:masterClrMapping/>
+  </p:clrMapOvr>
+</p:sld>
+</file>
+
+<file path=ppt/slides/slide13.xml><?xml version="1.0" encoding="utf-8"?>
+<p:sld xmlns:a="http://schemas.openxmlformats.org/drawingml/2006/main" xmlns:r="http://schemas.openxmlformats.org/officeDocument/2006/relationships" xmlns:p="http://schemas.openxmlformats.org/presentationml/2006/main">
+  <p:cSld>
+    <p:bg>
+      <p:bgPr>
+        <a:solidFill>
+          <a:schemeClr val="bg1"/>
+        </a:solidFill>
+        <a:effectLst/>
+      </p:bgPr>
+    </p:bg>
+    <p:spTree>
+      <p:nvGrpSpPr>
+        <p:cNvPr id="1" name=""/>
+        <p:cNvGrpSpPr/>
+        <p:nvPr/>
+      </p:nvGrpSpPr>
+      <p:grpSpPr>
+        <a:xfrm>
+          <a:off x="0" y="0"/>
+          <a:ext cx="0" cy="0"/>
+          <a:chOff x="0" y="0"/>
+          <a:chExt cx="0" cy="0"/>
+        </a:xfrm>
+      </p:grpSpPr>
+      <p:sp>
+        <p:nvSpPr>
+          <p:cNvPr id="31" name="Rectangle 30">
+            <a:extLst>
+              <a:ext uri="{FF2B5EF4-FFF2-40B4-BE49-F238E27FC236}">
+                <a16:creationId xmlns:a16="http://schemas.microsoft.com/office/drawing/2014/main" id="{42A4FC2C-047E-45A5-965D-8E1E3BF09BC6}"/>
+              </a:ext>
+              <a:ext uri="{C183D7F6-B498-43B3-948B-1728B52AA6E4}">
+                <adec:decorative xmlns:adec="http://schemas.microsoft.com/office/drawing/2017/decorative" val="1"/>
+              </a:ext>
+            </a:extLst>
+          </p:cNvPr>
+          <p:cNvSpPr>
+            <a:spLocks noGrp="1" noRot="1" noChangeAspect="1" noMove="1" noResize="1" noEditPoints="1" noAdjustHandles="1" noChangeArrowheads="1" noChangeShapeType="1" noTextEdit="1"/>
+          </p:cNvSpPr>
+          <p:nvPr>
+            <p:extLst>
+              <p:ext uri="{386F3935-93C4-4BCD-93E2-E3B085C9AB24}">
+                <p16:designElem xmlns:p16="http://schemas.microsoft.com/office/powerpoint/2015/main" val="1"/>
+              </p:ext>
+            </p:extLst>
+          </p:nvPr>
+        </p:nvSpPr>
+        <p:spPr bwMode="white">
+          <a:xfrm>
+            <a:off x="1524" y="0"/>
+            <a:ext cx="12188952" cy="6858000"/>
+          </a:xfrm>
+          <a:prstGeom prst="rect">
+            <a:avLst/>
+          </a:prstGeom>
+          <a:noFill/>
+          <a:ln>
+            <a:noFill/>
+          </a:ln>
+        </p:spPr>
+        <p:style>
+          <a:lnRef idx="2">
+            <a:schemeClr val="accent1">
+              <a:shade val="50000"/>
+            </a:schemeClr>
+          </a:lnRef>
+          <a:fillRef idx="1">
+            <a:schemeClr val="accent1"/>
+          </a:fillRef>
+          <a:effectRef idx="0">
+            <a:schemeClr val="accent1"/>
+          </a:effectRef>
+          <a:fontRef idx="minor">
+            <a:schemeClr val="lt1"/>
+          </a:fontRef>
+        </p:style>
+        <p:txBody>
+          <a:bodyPr rtlCol="0" anchor="ctr"/>
+          <a:lstStyle>
+            <a:defPPr>
+              <a:defRPr lang="en-US"/>
+            </a:defPPr>
+            <a:lvl1pPr marL="0" algn="l" defTabSz="914400" rtl="0" eaLnBrk="1" latinLnBrk="0" hangingPunct="1">
+              <a:defRPr sz="1800" kern="1200">
+                <a:solidFill>
+                  <a:schemeClr val="lt1"/>
+                </a:solidFill>
+                <a:latin typeface="+mn-lt"/>
+                <a:ea typeface="+mn-ea"/>
+                <a:cs typeface="+mn-cs"/>
+              </a:defRPr>
+            </a:lvl1pPr>
+            <a:lvl2pPr marL="457200" algn="l" defTabSz="914400" rtl="0" eaLnBrk="1" latinLnBrk="0" hangingPunct="1">
+              <a:defRPr sz="1800" kern="1200">
+                <a:solidFill>
+                  <a:schemeClr val="lt1"/>
+                </a:solidFill>
+                <a:latin typeface="+mn-lt"/>
+                <a:ea typeface="+mn-ea"/>
+                <a:cs typeface="+mn-cs"/>
+              </a:defRPr>
+            </a:lvl2pPr>
+            <a:lvl3pPr marL="914400" algn="l" defTabSz="914400" rtl="0" eaLnBrk="1" latinLnBrk="0" hangingPunct="1">
+              <a:defRPr sz="1800" kern="1200">
+                <a:solidFill>
+                  <a:schemeClr val="lt1"/>
+                </a:solidFill>
+                <a:latin typeface="+mn-lt"/>
+                <a:ea typeface="+mn-ea"/>
+                <a:cs typeface="+mn-cs"/>
+              </a:defRPr>
+            </a:lvl3pPr>
+            <a:lvl4pPr marL="1371600" algn="l" defTabSz="914400" rtl="0" eaLnBrk="1" latinLnBrk="0" hangingPunct="1">
+              <a:defRPr sz="1800" kern="1200">
+                <a:solidFill>
+                  <a:schemeClr val="lt1"/>
+                </a:solidFill>
+                <a:latin typeface="+mn-lt"/>
+                <a:ea typeface="+mn-ea"/>
+                <a:cs typeface="+mn-cs"/>
+              </a:defRPr>
+            </a:lvl4pPr>
+            <a:lvl5pPr marL="1828800" algn="l" defTabSz="914400" rtl="0" eaLnBrk="1" latinLnBrk="0" hangingPunct="1">
+              <a:defRPr sz="1800" kern="1200">
+                <a:solidFill>
+                  <a:schemeClr val="lt1"/>
+                </a:solidFill>
+                <a:latin typeface="+mn-lt"/>
+                <a:ea typeface="+mn-ea"/>
+                <a:cs typeface="+mn-cs"/>
+              </a:defRPr>
+            </a:lvl5pPr>
+            <a:lvl6pPr marL="2286000" algn="l" defTabSz="914400" rtl="0" eaLnBrk="1" latinLnBrk="0" hangingPunct="1">
+              <a:defRPr sz="1800" kern="1200">
+                <a:solidFill>
+                  <a:schemeClr val="lt1"/>
+                </a:solidFill>
+                <a:latin typeface="+mn-lt"/>
+                <a:ea typeface="+mn-ea"/>
+                <a:cs typeface="+mn-cs"/>
+              </a:defRPr>
+            </a:lvl6pPr>
+            <a:lvl7pPr marL="2743200" algn="l" defTabSz="914400" rtl="0" eaLnBrk="1" latinLnBrk="0" hangingPunct="1">
+              <a:defRPr sz="1800" kern="1200">
+                <a:solidFill>
+                  <a:schemeClr val="lt1"/>
+                </a:solidFill>
+                <a:latin typeface="+mn-lt"/>
+                <a:ea typeface="+mn-ea"/>
+                <a:cs typeface="+mn-cs"/>
+              </a:defRPr>
+            </a:lvl7pPr>
+            <a:lvl8pPr marL="3200400" algn="l" defTabSz="914400" rtl="0" eaLnBrk="1" latinLnBrk="0" hangingPunct="1">
+              <a:defRPr sz="1800" kern="1200">
+                <a:solidFill>
+                  <a:schemeClr val="lt1"/>
+                </a:solidFill>
+                <a:latin typeface="+mn-lt"/>
+                <a:ea typeface="+mn-ea"/>
+                <a:cs typeface="+mn-cs"/>
+              </a:defRPr>
+            </a:lvl8pPr>
+            <a:lvl9pPr marL="3657600" algn="l" defTabSz="914400" rtl="0" eaLnBrk="1" latinLnBrk="0" hangingPunct="1">
+              <a:defRPr sz="1800" kern="1200">
+                <a:solidFill>
+                  <a:schemeClr val="lt1"/>
+                </a:solidFill>
+                <a:latin typeface="+mn-lt"/>
+                <a:ea typeface="+mn-ea"/>
+                <a:cs typeface="+mn-cs"/>
+              </a:defRPr>
+            </a:lvl9pPr>
+          </a:lstStyle>
+          <a:p>
+            <a:pPr algn="ctr"/>
+            <a:endParaRPr lang="en-US"/>
+          </a:p>
+        </p:txBody>
+      </p:sp>
+      <p:pic>
+        <p:nvPicPr>
+          <p:cNvPr id="13" name="Espace réservé du contenu 8" descr="Une image contenant personne, homme, intérieur&#10;&#10;Description générée automatiquement">
+            <a:extLst>
+              <a:ext uri="{FF2B5EF4-FFF2-40B4-BE49-F238E27FC236}">
+                <a16:creationId xmlns:a16="http://schemas.microsoft.com/office/drawing/2014/main" id="{FF3CE1CD-27A6-9B47-8EF0-E128EC7E2053}"/>
+              </a:ext>
+            </a:extLst>
+          </p:cNvPr>
+          <p:cNvPicPr>
+            <a:picLocks noChangeAspect="1"/>
+          </p:cNvPicPr>
+          <p:nvPr/>
+        </p:nvPicPr>
+        <p:blipFill rotWithShape="1">
+          <a:blip r:embed="rId2"/>
+          <a:srcRect l="11095" r="1" b="1"/>
+          <a:stretch/>
+        </p:blipFill>
+        <p:spPr>
+          <a:xfrm>
+            <a:off x="20" y="1282"/>
+            <a:ext cx="12191980" cy="6856718"/>
+          </a:xfrm>
+          <a:prstGeom prst="rect">
+            <a:avLst/>
+          </a:prstGeom>
+        </p:spPr>
+      </p:pic>
+    </p:spTree>
+    <p:extLst>
+      <p:ext uri="{BB962C8B-B14F-4D97-AF65-F5344CB8AC3E}">
+        <p14:creationId xmlns:p14="http://schemas.microsoft.com/office/powerpoint/2010/main" val="2219327843"/>
+      </p:ext>
+    </p:extLst>
+  </p:cSld>
+  <p:clrMapOvr>
+    <a:masterClrMapping/>
+  </p:clrMapOvr>
+</p:sld>
+</file>
+
+<file path=ppt/slides/slide14.xml><?xml version="1.0" encoding="utf-8"?>
+<p:sld xmlns:a="http://schemas.openxmlformats.org/drawingml/2006/main" xmlns:r="http://schemas.openxmlformats.org/officeDocument/2006/relationships" xmlns:p="http://schemas.openxmlformats.org/presentationml/2006/main">
+  <p:cSld>
+    <p:bg>
+      <p:bgPr>
+        <a:solidFill>
+          <a:schemeClr val="bg1"/>
+        </a:solidFill>
+        <a:effectLst/>
+      </p:bgPr>
+    </p:bg>
+    <p:spTree>
+      <p:nvGrpSpPr>
+        <p:cNvPr id="1" name=""/>
+        <p:cNvGrpSpPr/>
+        <p:nvPr/>
+      </p:nvGrpSpPr>
+      <p:grpSpPr>
+        <a:xfrm>
+          <a:off x="0" y="0"/>
+          <a:ext cx="0" cy="0"/>
+          <a:chOff x="0" y="0"/>
+          <a:chExt cx="0" cy="0"/>
+        </a:xfrm>
+      </p:grpSpPr>
+      <p:sp useBgFill="1">
+        <p:nvSpPr>
+          <p:cNvPr id="25" name="Rectangle 24">
+            <a:extLst>
+              <a:ext uri="{FF2B5EF4-FFF2-40B4-BE49-F238E27FC236}">
+                <a16:creationId xmlns:a16="http://schemas.microsoft.com/office/drawing/2014/main" id="{C83A5C14-ED91-4CD1-809E-D29FF97C9AF5}"/>
+              </a:ext>
+              <a:ext uri="{C183D7F6-B498-43B3-948B-1728B52AA6E4}">
+                <adec:decorative xmlns:adec="http://schemas.microsoft.com/office/drawing/2017/decorative" val="1"/>
+              </a:ext>
+            </a:extLst>
+          </p:cNvPr>
+          <p:cNvSpPr>
+            <a:spLocks noGrp="1" noRot="1" noChangeAspect="1" noMove="1" noResize="1" noEditPoints="1" noAdjustHandles="1" noChangeArrowheads="1" noChangeShapeType="1" noTextEdit="1"/>
+          </p:cNvSpPr>
+          <p:nvPr>
+            <p:extLst>
+              <p:ext uri="{386F3935-93C4-4BCD-93E2-E3B085C9AB24}">
+                <p16:designElem xmlns:p16="http://schemas.microsoft.com/office/powerpoint/2015/main" val="1"/>
+              </p:ext>
+            </p:extLst>
+          </p:nvPr>
+        </p:nvSpPr>
+        <p:spPr>
+          <a:xfrm>
+            <a:off x="0" y="0"/>
+            <a:ext cx="12192000" cy="6858000"/>
+          </a:xfrm>
+          <a:prstGeom prst="rect">
+            <a:avLst/>
+          </a:prstGeom>
+          <a:ln>
+            <a:noFill/>
+          </a:ln>
+        </p:spPr>
+        <p:style>
+          <a:lnRef idx="2">
+            <a:schemeClr val="accent1">
+              <a:shade val="50000"/>
+            </a:schemeClr>
+          </a:lnRef>
+          <a:fillRef idx="1">
+            <a:schemeClr val="accent1"/>
+          </a:fillRef>
+          <a:effectRef idx="0">
+            <a:schemeClr val="accent1"/>
+          </a:effectRef>
+          <a:fontRef idx="minor">
+            <a:schemeClr val="lt1"/>
+          </a:fontRef>
+        </p:style>
+        <p:txBody>
+          <a:bodyPr rtlCol="0" anchor="ctr"/>
+          <a:lstStyle/>
+          <a:p>
+            <a:pPr algn="ctr"/>
+            <a:endParaRPr lang="en-US"/>
+          </a:p>
+        </p:txBody>
+      </p:sp>
+      <p:sp useBgFill="1">
+        <p:nvSpPr>
+          <p:cNvPr id="27" name="Freeform: Shape 26">
+            <a:extLst>
+              <a:ext uri="{FF2B5EF4-FFF2-40B4-BE49-F238E27FC236}">
+                <a16:creationId xmlns:a16="http://schemas.microsoft.com/office/drawing/2014/main" id="{56065185-5C34-4F86-AA96-AA4D065B0EF4}"/>
+              </a:ext>
+              <a:ext uri="{C183D7F6-B498-43B3-948B-1728B52AA6E4}">
+                <adec:decorative xmlns:adec="http://schemas.microsoft.com/office/drawing/2017/decorative" val="1"/>
+              </a:ext>
+            </a:extLst>
+          </p:cNvPr>
+          <p:cNvSpPr>
+            <a:spLocks noGrp="1" noRot="1" noChangeAspect="1" noMove="1" noResize="1" noEditPoints="1" noAdjustHandles="1" noChangeArrowheads="1" noChangeShapeType="1" noTextEdit="1"/>
+          </p:cNvSpPr>
+          <p:nvPr>
+            <p:extLst>
+              <p:ext uri="{386F3935-93C4-4BCD-93E2-E3B085C9AB24}">
+                <p16:designElem xmlns:p16="http://schemas.microsoft.com/office/powerpoint/2015/main" val="1"/>
+              </p:ext>
+            </p:extLst>
+          </p:nvPr>
+        </p:nvSpPr>
+        <p:spPr>
+          <a:xfrm>
+            <a:off x="1114425" y="0"/>
+            <a:ext cx="9963150" cy="6858000"/>
+          </a:xfrm>
+          <a:custGeom>
+            <a:avLst/>
+            <a:gdLst>
+              <a:gd name="connsiteX0" fmla="*/ 1595771 w 9963150"/>
+              <a:gd name="connsiteY0" fmla="*/ 0 h 6858000"/>
+              <a:gd name="connsiteX1" fmla="*/ 8367379 w 9963150"/>
+              <a:gd name="connsiteY1" fmla="*/ 0 h 6858000"/>
+              <a:gd name="connsiteX2" fmla="*/ 8504080 w 9963150"/>
+              <a:gd name="connsiteY2" fmla="*/ 130333 h 6858000"/>
+              <a:gd name="connsiteX3" fmla="*/ 9963150 w 9963150"/>
+              <a:gd name="connsiteY3" fmla="*/ 3652838 h 6858000"/>
+              <a:gd name="connsiteX4" fmla="*/ 8825600 w 9963150"/>
+              <a:gd name="connsiteY4" fmla="*/ 6821583 h 6858000"/>
+              <a:gd name="connsiteX5" fmla="*/ 8794055 w 9963150"/>
+              <a:gd name="connsiteY5" fmla="*/ 6858000 h 6858000"/>
+              <a:gd name="connsiteX6" fmla="*/ 1169096 w 9963150"/>
+              <a:gd name="connsiteY6" fmla="*/ 6858000 h 6858000"/>
+              <a:gd name="connsiteX7" fmla="*/ 1137550 w 9963150"/>
+              <a:gd name="connsiteY7" fmla="*/ 6821583 h 6858000"/>
+              <a:gd name="connsiteX8" fmla="*/ 0 w 9963150"/>
+              <a:gd name="connsiteY8" fmla="*/ 3652838 h 6858000"/>
+              <a:gd name="connsiteX9" fmla="*/ 1459070 w 9963150"/>
+              <a:gd name="connsiteY9" fmla="*/ 130333 h 6858000"/>
+            </a:gdLst>
+            <a:ahLst/>
+            <a:cxnLst>
+              <a:cxn ang="0">
+                <a:pos x="connsiteX0" y="connsiteY0"/>
+              </a:cxn>
+              <a:cxn ang="0">
+                <a:pos x="connsiteX1" y="connsiteY1"/>
+              </a:cxn>
+              <a:cxn ang="0">
+                <a:pos x="connsiteX2" y="connsiteY2"/>
+              </a:cxn>
+              <a:cxn ang="0">
+                <a:pos x="connsiteX3" y="connsiteY3"/>
+              </a:cxn>
+              <a:cxn ang="0">
+                <a:pos x="connsiteX4" y="connsiteY4"/>
+              </a:cxn>
+              <a:cxn ang="0">
+                <a:pos x="connsiteX5" y="connsiteY5"/>
+              </a:cxn>
+              <a:cxn ang="0">
+                <a:pos x="connsiteX6" y="connsiteY6"/>
+              </a:cxn>
+              <a:cxn ang="0">
+                <a:pos x="connsiteX7" y="connsiteY7"/>
+              </a:cxn>
+              <a:cxn ang="0">
+                <a:pos x="connsiteX8" y="connsiteY8"/>
+              </a:cxn>
+              <a:cxn ang="0">
+                <a:pos x="connsiteX9" y="connsiteY9"/>
+              </a:cxn>
+            </a:cxnLst>
+            <a:rect l="l" t="t" r="r" b="b"/>
+            <a:pathLst>
+              <a:path w="9963150" h="6858000">
+                <a:moveTo>
+                  <a:pt x="1595771" y="0"/>
+                </a:moveTo>
+                <a:lnTo>
+                  <a:pt x="8367379" y="0"/>
+                </a:lnTo>
+                <a:lnTo>
+                  <a:pt x="8504080" y="130333"/>
+                </a:lnTo>
+                <a:cubicBezTo>
+                  <a:pt x="9405568" y="1031820"/>
+                  <a:pt x="9963150" y="2277214"/>
+                  <a:pt x="9963150" y="3652838"/>
+                </a:cubicBezTo>
+                <a:cubicBezTo>
+                  <a:pt x="9963150" y="4856509"/>
+                  <a:pt x="9536251" y="5960473"/>
+                  <a:pt x="8825600" y="6821583"/>
+                </a:cubicBezTo>
+                <a:lnTo>
+                  <a:pt x="8794055" y="6858000"/>
+                </a:lnTo>
+                <a:lnTo>
+                  <a:pt x="1169096" y="6858000"/>
+                </a:lnTo>
+                <a:lnTo>
+                  <a:pt x="1137550" y="6821583"/>
+                </a:lnTo>
+                <a:cubicBezTo>
+                  <a:pt x="426899" y="5960473"/>
+                  <a:pt x="0" y="4856509"/>
+                  <a:pt x="0" y="3652838"/>
+                </a:cubicBezTo>
+                <a:cubicBezTo>
+                  <a:pt x="0" y="2277214"/>
+                  <a:pt x="557582" y="1031820"/>
+                  <a:pt x="1459070" y="130333"/>
+                </a:cubicBezTo>
+                <a:close/>
+              </a:path>
+            </a:pathLst>
+          </a:custGeom>
+          <a:ln w="9525">
+            <a:solidFill>
+              <a:srgbClr val="EFEFEF"/>
+            </a:solidFill>
+          </a:ln>
+          <a:effectLst>
+            <a:outerShdw blurRad="101600" sx="102000" sy="102000" algn="ctr" rotWithShape="0">
+              <a:schemeClr val="bg1">
+                <a:lumMod val="85000"/>
+                <a:alpha val="50000"/>
+              </a:schemeClr>
+            </a:outerShdw>
+          </a:effectLst>
+        </p:spPr>
+        <p:style>
+          <a:lnRef idx="2">
+            <a:schemeClr val="accent1">
+              <a:shade val="50000"/>
+            </a:schemeClr>
+          </a:lnRef>
+          <a:fillRef idx="1">
+            <a:schemeClr val="accent1"/>
+          </a:fillRef>
+          <a:effectRef idx="0">
+            <a:schemeClr val="accent1"/>
+          </a:effectRef>
+          <a:fontRef idx="minor">
+            <a:schemeClr val="lt1"/>
+          </a:fontRef>
+        </p:style>
+        <p:txBody>
+          <a:bodyPr wrap="square" rtlCol="0" anchor="ctr">
+            <a:noAutofit/>
+          </a:bodyPr>
+          <a:lstStyle/>
+          <a:p>
+            <a:pPr marL="0" marR="0" lvl="0" indent="0" algn="ctr" defTabSz="914400" rtl="0" eaLnBrk="1" fontAlgn="auto" latinLnBrk="0" hangingPunct="1">
+              <a:lnSpc>
+                <a:spcPct val="100000"/>
+              </a:lnSpc>
+              <a:spcBef>
+                <a:spcPts val="0"/>
+              </a:spcBef>
+              <a:spcAft>
+                <a:spcPts val="0"/>
+              </a:spcAft>
+              <a:buClrTx/>
+              <a:buSzTx/>
+              <a:buFontTx/>
+              <a:buNone/>
+              <a:tabLst/>
+              <a:defRPr/>
+            </a:pPr>
+            <a:endParaRPr kumimoji="0" lang="en-US" sz="1800" b="0" i="0" u="none" strike="noStrike" kern="1200" cap="none" spc="0" normalizeH="0" baseline="0" noProof="0">
+              <a:ln>
+                <a:noFill/>
+              </a:ln>
+              <a:solidFill>
+                <a:prstClr val="white"/>
+              </a:solidFill>
+              <a:effectLst/>
+              <a:uLnTx/>
+              <a:uFillTx/>
+              <a:latin typeface="Calibri" panose="020F0502020204030204"/>
+              <a:ea typeface="+mn-ea"/>
+              <a:cs typeface="+mn-cs"/>
+            </a:endParaRPr>
+          </a:p>
+        </p:txBody>
+      </p:sp>
+      <p:pic>
+        <p:nvPicPr>
+          <p:cNvPr id="3" name="Image 2" descr="Une image contenant personne, homme, complet, foule&#10;&#10;Description générée automatiquement">
+            <a:extLst>
+              <a:ext uri="{FF2B5EF4-FFF2-40B4-BE49-F238E27FC236}">
+                <a16:creationId xmlns:a16="http://schemas.microsoft.com/office/drawing/2014/main" id="{7FBA346D-D934-7F49-B594-5A991E6ABEDB}"/>
+              </a:ext>
+            </a:extLst>
+          </p:cNvPr>
+          <p:cNvPicPr>
+            <a:picLocks noChangeAspect="1"/>
+          </p:cNvPicPr>
+          <p:nvPr/>
+        </p:nvPicPr>
+        <p:blipFill rotWithShape="1">
+          <a:blip r:embed="rId2"/>
+          <a:srcRect r="3026" b="-1"/>
+          <a:stretch/>
+        </p:blipFill>
+        <p:spPr>
+          <a:xfrm>
+            <a:off x="1114426" y="10"/>
+            <a:ext cx="9963149" cy="6857990"/>
+          </a:xfrm>
+          <a:custGeom>
+            <a:avLst/>
+            <a:gdLst/>
+            <a:ahLst/>
+            <a:cxnLst/>
+            <a:rect l="l" t="t" r="r" b="b"/>
+            <a:pathLst>
+              <a:path w="9948672" h="6858000">
+                <a:moveTo>
+                  <a:pt x="1593452" y="0"/>
+                </a:moveTo>
+                <a:lnTo>
+                  <a:pt x="8355220" y="0"/>
+                </a:lnTo>
+                <a:lnTo>
+                  <a:pt x="8491722" y="130333"/>
+                </a:lnTo>
+                <a:cubicBezTo>
+                  <a:pt x="9391900" y="1031820"/>
+                  <a:pt x="9948672" y="2277214"/>
+                  <a:pt x="9948672" y="3652838"/>
+                </a:cubicBezTo>
+                <a:cubicBezTo>
+                  <a:pt x="9948672" y="4856509"/>
+                  <a:pt x="9522393" y="5960473"/>
+                  <a:pt x="8812775" y="6821583"/>
+                </a:cubicBezTo>
+                <a:lnTo>
+                  <a:pt x="8781276" y="6858000"/>
+                </a:lnTo>
+                <a:lnTo>
+                  <a:pt x="1167397" y="6858000"/>
+                </a:lnTo>
+                <a:lnTo>
+                  <a:pt x="1135897" y="6821583"/>
+                </a:lnTo>
+                <a:cubicBezTo>
+                  <a:pt x="426279" y="5960473"/>
+                  <a:pt x="0" y="4856509"/>
+                  <a:pt x="0" y="3652838"/>
+                </a:cubicBezTo>
+                <a:cubicBezTo>
+                  <a:pt x="0" y="2277214"/>
+                  <a:pt x="556772" y="1031820"/>
+                  <a:pt x="1456950" y="130333"/>
+                </a:cubicBezTo>
+                <a:close/>
+              </a:path>
+            </a:pathLst>
+          </a:custGeom>
+        </p:spPr>
+      </p:pic>
+    </p:spTree>
+    <p:extLst>
+      <p:ext uri="{BB962C8B-B14F-4D97-AF65-F5344CB8AC3E}">
+        <p14:creationId xmlns:p14="http://schemas.microsoft.com/office/powerpoint/2010/main" val="3985733965"/>
       </p:ext>
     </p:extLst>
   </p:cSld>

</xml_diff>